<commit_message>
meating record and ppt
</commit_message>
<xml_diff>
--- a/ppts/Detector.pptx
+++ b/ppts/Detector.pptx
@@ -7,11 +7,15 @@
   <p:sldIdLst>
     <p:sldId id="256" r:id="rId2"/>
     <p:sldId id="258" r:id="rId3"/>
-    <p:sldId id="259" r:id="rId4"/>
-    <p:sldId id="263" r:id="rId5"/>
-    <p:sldId id="260" r:id="rId6"/>
-    <p:sldId id="261" r:id="rId7"/>
-    <p:sldId id="262" r:id="rId8"/>
+    <p:sldId id="264" r:id="rId4"/>
+    <p:sldId id="265" r:id="rId5"/>
+    <p:sldId id="266" r:id="rId6"/>
+    <p:sldId id="259" r:id="rId7"/>
+    <p:sldId id="263" r:id="rId8"/>
+    <p:sldId id="260" r:id="rId9"/>
+    <p:sldId id="261" r:id="rId10"/>
+    <p:sldId id="262" r:id="rId11"/>
+    <p:sldId id="267" r:id="rId12"/>
   </p:sldIdLst>
   <p:sldSz cx="12192000" cy="6858000"/>
   <p:notesSz cx="6858000" cy="9144000"/>
@@ -265,7 +269,7 @@
           <a:p>
             <a:fld id="{CAD681B8-7C7D-463E-9549-C0CA263403C8}" type="datetimeFigureOut">
               <a:rPr lang="zh-TW" altLang="en-US" smtClean="0"/>
-              <a:t>2024/4/3</a:t>
+              <a:t>2024/4/5</a:t>
             </a:fld>
             <a:endParaRPr lang="zh-TW" altLang="en-US"/>
           </a:p>
@@ -463,7 +467,7 @@
           <a:p>
             <a:fld id="{CAD681B8-7C7D-463E-9549-C0CA263403C8}" type="datetimeFigureOut">
               <a:rPr lang="zh-TW" altLang="en-US" smtClean="0"/>
-              <a:t>2024/4/3</a:t>
+              <a:t>2024/4/5</a:t>
             </a:fld>
             <a:endParaRPr lang="zh-TW" altLang="en-US"/>
           </a:p>
@@ -671,7 +675,7 @@
           <a:p>
             <a:fld id="{CAD681B8-7C7D-463E-9549-C0CA263403C8}" type="datetimeFigureOut">
               <a:rPr lang="zh-TW" altLang="en-US" smtClean="0"/>
-              <a:t>2024/4/3</a:t>
+              <a:t>2024/4/5</a:t>
             </a:fld>
             <a:endParaRPr lang="zh-TW" altLang="en-US"/>
           </a:p>
@@ -869,7 +873,7 @@
           <a:p>
             <a:fld id="{CAD681B8-7C7D-463E-9549-C0CA263403C8}" type="datetimeFigureOut">
               <a:rPr lang="zh-TW" altLang="en-US" smtClean="0"/>
-              <a:t>2024/4/3</a:t>
+              <a:t>2024/4/5</a:t>
             </a:fld>
             <a:endParaRPr lang="zh-TW" altLang="en-US"/>
           </a:p>
@@ -1144,7 +1148,7 @@
           <a:p>
             <a:fld id="{CAD681B8-7C7D-463E-9549-C0CA263403C8}" type="datetimeFigureOut">
               <a:rPr lang="zh-TW" altLang="en-US" smtClean="0"/>
-              <a:t>2024/4/3</a:t>
+              <a:t>2024/4/5</a:t>
             </a:fld>
             <a:endParaRPr lang="zh-TW" altLang="en-US"/>
           </a:p>
@@ -1409,7 +1413,7 @@
           <a:p>
             <a:fld id="{CAD681B8-7C7D-463E-9549-C0CA263403C8}" type="datetimeFigureOut">
               <a:rPr lang="zh-TW" altLang="en-US" smtClean="0"/>
-              <a:t>2024/4/3</a:t>
+              <a:t>2024/4/5</a:t>
             </a:fld>
             <a:endParaRPr lang="zh-TW" altLang="en-US"/>
           </a:p>
@@ -1821,7 +1825,7 @@
           <a:p>
             <a:fld id="{CAD681B8-7C7D-463E-9549-C0CA263403C8}" type="datetimeFigureOut">
               <a:rPr lang="zh-TW" altLang="en-US" smtClean="0"/>
-              <a:t>2024/4/3</a:t>
+              <a:t>2024/4/5</a:t>
             </a:fld>
             <a:endParaRPr lang="zh-TW" altLang="en-US"/>
           </a:p>
@@ -1962,7 +1966,7 @@
           <a:p>
             <a:fld id="{CAD681B8-7C7D-463E-9549-C0CA263403C8}" type="datetimeFigureOut">
               <a:rPr lang="zh-TW" altLang="en-US" smtClean="0"/>
-              <a:t>2024/4/3</a:t>
+              <a:t>2024/4/5</a:t>
             </a:fld>
             <a:endParaRPr lang="zh-TW" altLang="en-US"/>
           </a:p>
@@ -2075,7 +2079,7 @@
           <a:p>
             <a:fld id="{CAD681B8-7C7D-463E-9549-C0CA263403C8}" type="datetimeFigureOut">
               <a:rPr lang="zh-TW" altLang="en-US" smtClean="0"/>
-              <a:t>2024/4/3</a:t>
+              <a:t>2024/4/5</a:t>
             </a:fld>
             <a:endParaRPr lang="zh-TW" altLang="en-US"/>
           </a:p>
@@ -2386,7 +2390,7 @@
           <a:p>
             <a:fld id="{CAD681B8-7C7D-463E-9549-C0CA263403C8}" type="datetimeFigureOut">
               <a:rPr lang="zh-TW" altLang="en-US" smtClean="0"/>
-              <a:t>2024/4/3</a:t>
+              <a:t>2024/4/5</a:t>
             </a:fld>
             <a:endParaRPr lang="zh-TW" altLang="en-US"/>
           </a:p>
@@ -2674,7 +2678,7 @@
           <a:p>
             <a:fld id="{CAD681B8-7C7D-463E-9549-C0CA263403C8}" type="datetimeFigureOut">
               <a:rPr lang="zh-TW" altLang="en-US" smtClean="0"/>
-              <a:t>2024/4/3</a:t>
+              <a:t>2024/4/5</a:t>
             </a:fld>
             <a:endParaRPr lang="zh-TW" altLang="en-US"/>
           </a:p>
@@ -2915,7 +2919,7 @@
           <a:p>
             <a:fld id="{CAD681B8-7C7D-463E-9549-C0CA263403C8}" type="datetimeFigureOut">
               <a:rPr lang="zh-TW" altLang="en-US" smtClean="0"/>
-              <a:t>2024/4/3</a:t>
+              <a:t>2024/4/5</a:t>
             </a:fld>
             <a:endParaRPr lang="zh-TW" altLang="en-US"/>
           </a:p>
@@ -3399,6 +3403,264 @@
 </p:sld>
 </file>
 
+<file path=ppt/slides/slide10.xml><?xml version="1.0" encoding="utf-8"?>
+<p:sld xmlns:a="http://schemas.openxmlformats.org/drawingml/2006/main" xmlns:r="http://schemas.openxmlformats.org/officeDocument/2006/relationships" xmlns:p="http://schemas.openxmlformats.org/presentationml/2006/main">
+  <p:cSld>
+    <p:spTree>
+      <p:nvGrpSpPr>
+        <p:cNvPr id="1" name=""/>
+        <p:cNvGrpSpPr/>
+        <p:nvPr/>
+      </p:nvGrpSpPr>
+      <p:grpSpPr>
+        <a:xfrm>
+          <a:off x="0" y="0"/>
+          <a:ext cx="0" cy="0"/>
+          <a:chOff x="0" y="0"/>
+          <a:chExt cx="0" cy="0"/>
+        </a:xfrm>
+      </p:grpSpPr>
+      <p:sp>
+        <p:nvSpPr>
+          <p:cNvPr id="2" name="標題 1">
+            <a:extLst>
+              <a:ext uri="{FF2B5EF4-FFF2-40B4-BE49-F238E27FC236}">
+                <a16:creationId xmlns:a16="http://schemas.microsoft.com/office/drawing/2014/main" id="{F3251EE3-41A4-4B6F-915B-153BA5E0B7C7}"/>
+              </a:ext>
+            </a:extLst>
+          </p:cNvPr>
+          <p:cNvSpPr>
+            <a:spLocks noGrp="1"/>
+          </p:cNvSpPr>
+          <p:nvPr>
+            <p:ph type="title"/>
+          </p:nvPr>
+        </p:nvSpPr>
+        <p:spPr/>
+        <p:txBody>
+          <a:bodyPr/>
+          <a:lstStyle/>
+          <a:p>
+            <a:r>
+              <a:rPr lang="en-US" altLang="zh-TW" dirty="0"/>
+              <a:t>Create module</a:t>
+            </a:r>
+            <a:endParaRPr lang="zh-TW" altLang="en-US" dirty="0"/>
+          </a:p>
+        </p:txBody>
+      </p:sp>
+      <p:pic>
+        <p:nvPicPr>
+          <p:cNvPr id="6" name="內容版面配置區 5">
+            <a:extLst>
+              <a:ext uri="{FF2B5EF4-FFF2-40B4-BE49-F238E27FC236}">
+                <a16:creationId xmlns:a16="http://schemas.microsoft.com/office/drawing/2014/main" id="{F6BC85E0-8BDD-4C8C-825C-4630BEE17E1E}"/>
+              </a:ext>
+            </a:extLst>
+          </p:cNvPr>
+          <p:cNvPicPr>
+            <a:picLocks noGrp="1" noChangeAspect="1"/>
+          </p:cNvPicPr>
+          <p:nvPr>
+            <p:ph idx="1"/>
+          </p:nvPr>
+        </p:nvPicPr>
+        <p:blipFill>
+          <a:blip r:embed="rId2"/>
+          <a:stretch>
+            <a:fillRect/>
+          </a:stretch>
+        </p:blipFill>
+        <p:spPr>
+          <a:xfrm>
+            <a:off x="6099621" y="0"/>
+            <a:ext cx="6092380" cy="6858001"/>
+          </a:xfrm>
+        </p:spPr>
+      </p:pic>
+      <p:sp>
+        <p:nvSpPr>
+          <p:cNvPr id="4" name="文字版面配置區 3">
+            <a:extLst>
+              <a:ext uri="{FF2B5EF4-FFF2-40B4-BE49-F238E27FC236}">
+                <a16:creationId xmlns:a16="http://schemas.microsoft.com/office/drawing/2014/main" id="{FEEBFCFD-0289-4D98-B2BC-12BBD865C819}"/>
+              </a:ext>
+            </a:extLst>
+          </p:cNvPr>
+          <p:cNvSpPr>
+            <a:spLocks noGrp="1"/>
+          </p:cNvSpPr>
+          <p:nvPr>
+            <p:ph type="body" sz="half" idx="2"/>
+          </p:nvPr>
+        </p:nvSpPr>
+        <p:spPr/>
+        <p:txBody>
+          <a:bodyPr/>
+          <a:lstStyle/>
+          <a:p>
+            <a:endParaRPr lang="zh-TW" altLang="en-US" dirty="0"/>
+          </a:p>
+        </p:txBody>
+      </p:sp>
+    </p:spTree>
+    <p:extLst>
+      <p:ext uri="{BB962C8B-B14F-4D97-AF65-F5344CB8AC3E}">
+        <p14:creationId xmlns:p14="http://schemas.microsoft.com/office/powerpoint/2010/main" val="1708953756"/>
+      </p:ext>
+    </p:extLst>
+  </p:cSld>
+  <p:clrMapOvr>
+    <a:masterClrMapping/>
+  </p:clrMapOvr>
+</p:sld>
+</file>
+
+<file path=ppt/slides/slide11.xml><?xml version="1.0" encoding="utf-8"?>
+<p:sld xmlns:a="http://schemas.openxmlformats.org/drawingml/2006/main" xmlns:r="http://schemas.openxmlformats.org/officeDocument/2006/relationships" xmlns:p="http://schemas.openxmlformats.org/presentationml/2006/main">
+  <p:cSld>
+    <p:spTree>
+      <p:nvGrpSpPr>
+        <p:cNvPr id="1" name=""/>
+        <p:cNvGrpSpPr/>
+        <p:nvPr/>
+      </p:nvGrpSpPr>
+      <p:grpSpPr>
+        <a:xfrm>
+          <a:off x="0" y="0"/>
+          <a:ext cx="0" cy="0"/>
+          <a:chOff x="0" y="0"/>
+          <a:chExt cx="0" cy="0"/>
+        </a:xfrm>
+      </p:grpSpPr>
+      <p:sp>
+        <p:nvSpPr>
+          <p:cNvPr id="2" name="標題 1">
+            <a:extLst>
+              <a:ext uri="{FF2B5EF4-FFF2-40B4-BE49-F238E27FC236}">
+                <a16:creationId xmlns:a16="http://schemas.microsoft.com/office/drawing/2014/main" id="{7A599BA4-90E0-4047-A3F4-39F75E354287}"/>
+              </a:ext>
+            </a:extLst>
+          </p:cNvPr>
+          <p:cNvSpPr>
+            <a:spLocks noGrp="1"/>
+          </p:cNvSpPr>
+          <p:nvPr>
+            <p:ph type="title"/>
+          </p:nvPr>
+        </p:nvSpPr>
+        <p:spPr/>
+        <p:txBody>
+          <a:bodyPr/>
+          <a:lstStyle/>
+          <a:p>
+            <a:r>
+              <a:rPr lang="zh-TW" altLang="en-US" dirty="0"/>
+              <a:t>分工</a:t>
+            </a:r>
+          </a:p>
+        </p:txBody>
+      </p:sp>
+      <p:sp>
+        <p:nvSpPr>
+          <p:cNvPr id="3" name="內容版面配置區 2">
+            <a:extLst>
+              <a:ext uri="{FF2B5EF4-FFF2-40B4-BE49-F238E27FC236}">
+                <a16:creationId xmlns:a16="http://schemas.microsoft.com/office/drawing/2014/main" id="{420BF305-2AF5-4258-B778-8F7B5AE0D2C3}"/>
+              </a:ext>
+            </a:extLst>
+          </p:cNvPr>
+          <p:cNvSpPr>
+            <a:spLocks noGrp="1"/>
+          </p:cNvSpPr>
+          <p:nvPr>
+            <p:ph idx="1"/>
+          </p:nvPr>
+        </p:nvSpPr>
+        <p:spPr/>
+        <p:txBody>
+          <a:bodyPr/>
+          <a:lstStyle/>
+          <a:p>
+            <a:r>
+              <a:rPr lang="en-US" altLang="zh-TW" dirty="0" err="1"/>
+              <a:t>Opencv</a:t>
+            </a:r>
+            <a:r>
+              <a:rPr lang="zh-TW" altLang="en-US" dirty="0"/>
+              <a:t>：燁子、喵嗚喵</a:t>
+            </a:r>
+            <a:endParaRPr lang="en-US" altLang="zh-TW" dirty="0"/>
+          </a:p>
+          <a:p>
+            <a:r>
+              <a:rPr lang="zh-TW" altLang="en-US" dirty="0"/>
+              <a:t>黑盒子：</a:t>
+            </a:r>
+            <a:r>
+              <a:rPr lang="en-US" altLang="zh-TW" dirty="0" err="1"/>
+              <a:t>ChenChen</a:t>
+            </a:r>
+            <a:endParaRPr lang="en-US" altLang="zh-TW" dirty="0"/>
+          </a:p>
+          <a:p>
+            <a:endParaRPr lang="en-US" altLang="zh-TW" dirty="0"/>
+          </a:p>
+          <a:p>
+            <a:r>
+              <a:rPr lang="en-US" altLang="zh-TW" dirty="0"/>
+              <a:t>Deadline: 04/14 (</a:t>
+            </a:r>
+            <a:r>
+              <a:rPr lang="zh-TW" altLang="en-US" dirty="0"/>
+              <a:t>日</a:t>
+            </a:r>
+            <a:r>
+              <a:rPr lang="en-US" altLang="zh-TW" dirty="0"/>
+              <a:t>)</a:t>
+            </a:r>
+            <a:endParaRPr lang="zh-TW" altLang="en-US" dirty="0"/>
+          </a:p>
+        </p:txBody>
+      </p:sp>
+      <p:sp>
+        <p:nvSpPr>
+          <p:cNvPr id="4" name="文字版面配置區 3">
+            <a:extLst>
+              <a:ext uri="{FF2B5EF4-FFF2-40B4-BE49-F238E27FC236}">
+                <a16:creationId xmlns:a16="http://schemas.microsoft.com/office/drawing/2014/main" id="{6914B833-E632-4B73-BD99-3C2739CBA0B4}"/>
+              </a:ext>
+            </a:extLst>
+          </p:cNvPr>
+          <p:cNvSpPr>
+            <a:spLocks noGrp="1"/>
+          </p:cNvSpPr>
+          <p:nvPr>
+            <p:ph type="body" sz="half" idx="2"/>
+          </p:nvPr>
+        </p:nvSpPr>
+        <p:spPr/>
+        <p:txBody>
+          <a:bodyPr/>
+          <a:lstStyle/>
+          <a:p>
+            <a:endParaRPr lang="zh-TW" altLang="en-US" dirty="0"/>
+          </a:p>
+        </p:txBody>
+      </p:sp>
+    </p:spTree>
+    <p:extLst>
+      <p:ext uri="{BB962C8B-B14F-4D97-AF65-F5344CB8AC3E}">
+        <p14:creationId xmlns:p14="http://schemas.microsoft.com/office/powerpoint/2010/main" val="3869577358"/>
+      </p:ext>
+    </p:extLst>
+  </p:cSld>
+  <p:clrMapOvr>
+    <a:masterClrMapping/>
+  </p:clrMapOvr>
+</p:sld>
+</file>
+
 <file path=ppt/slides/slide2.xml><?xml version="1.0" encoding="utf-8"?>
 <p:sld xmlns:a="http://schemas.openxmlformats.org/drawingml/2006/main" xmlns:r="http://schemas.openxmlformats.org/officeDocument/2006/relationships" xmlns:p="http://schemas.openxmlformats.org/presentationml/2006/main">
   <p:cSld>
@@ -3511,6 +3773,27 @@
                 <a:hlinkClick r:id="rId4"/>
               </a:rPr>
               <a:t>OpenCV: Camera calibration and 3D reconstruction (calib3d module)</a:t>
+            </a:r>
+            <a:endParaRPr lang="en-US" altLang="zh-TW" dirty="0"/>
+          </a:p>
+          <a:p>
+            <a:r>
+              <a:rPr lang="en-US" altLang="zh-TW" dirty="0">
+                <a:hlinkClick r:id="rId5"/>
+              </a:rPr>
+              <a:t>OpenCV: Detection of </a:t>
+            </a:r>
+            <a:r>
+              <a:rPr lang="en-US" altLang="zh-TW" dirty="0" err="1">
+                <a:hlinkClick r:id="rId5"/>
+              </a:rPr>
+              <a:t>ArUco</a:t>
+            </a:r>
+            <a:r>
+              <a:rPr lang="en-US" altLang="zh-TW" dirty="0">
+                <a:hlinkClick r:id="rId5"/>
+              </a:rPr>
+              <a:t> boards</a:t>
             </a:r>
             <a:endParaRPr lang="zh-TW" altLang="en-US" dirty="0"/>
           </a:p>
@@ -3630,41 +3913,12 @@
           <a:chExt cx="0" cy="0"/>
         </a:xfrm>
       </p:grpSpPr>
-      <p:sp>
-        <p:nvSpPr>
-          <p:cNvPr id="5" name="標題 4">
-            <a:extLst>
-              <a:ext uri="{FF2B5EF4-FFF2-40B4-BE49-F238E27FC236}">
-                <a16:creationId xmlns:a16="http://schemas.microsoft.com/office/drawing/2014/main" id="{4135E36C-5D6D-4F3A-AFC7-FE6129E42A2A}"/>
-              </a:ext>
-            </a:extLst>
-          </p:cNvPr>
-          <p:cNvSpPr>
-            <a:spLocks noGrp="1"/>
-          </p:cNvSpPr>
-          <p:nvPr>
-            <p:ph type="title"/>
-          </p:nvPr>
-        </p:nvSpPr>
-        <p:spPr/>
-        <p:txBody>
-          <a:bodyPr/>
-          <a:lstStyle/>
-          <a:p>
-            <a:r>
-              <a:rPr lang="en-US" altLang="zh-TW" dirty="0"/>
-              <a:t>Detection</a:t>
-            </a:r>
-            <a:endParaRPr lang="zh-TW" altLang="en-US" dirty="0"/>
-          </a:p>
-        </p:txBody>
-      </p:sp>
       <p:pic>
         <p:nvPicPr>
-          <p:cNvPr id="9" name="內容版面配置區 8">
-            <a:extLst>
-              <a:ext uri="{FF2B5EF4-FFF2-40B4-BE49-F238E27FC236}">
-                <a16:creationId xmlns:a16="http://schemas.microsoft.com/office/drawing/2014/main" id="{44F97183-A505-426C-9C8A-792A86951D80}"/>
+          <p:cNvPr id="10" name="內容版面配置區 9">
+            <a:extLst>
+              <a:ext uri="{FF2B5EF4-FFF2-40B4-BE49-F238E27FC236}">
+                <a16:creationId xmlns:a16="http://schemas.microsoft.com/office/drawing/2014/main" id="{286449DC-950C-4950-A8F2-BE79E32D0499}"/>
               </a:ext>
             </a:extLst>
           </p:cNvPr>
@@ -3676,24 +3930,59 @@
           </p:nvPr>
         </p:nvPicPr>
         <p:blipFill>
-          <a:blip r:embed="rId2"/>
+          <a:blip r:embed="rId2">
+            <a:extLst>
+              <a:ext uri="{28A0092B-C50C-407E-A947-70E740481C1C}">
+                <a14:useLocalDpi xmlns:a14="http://schemas.microsoft.com/office/drawing/2010/main" val="0"/>
+              </a:ext>
+            </a:extLst>
+          </a:blip>
           <a:stretch>
             <a:fillRect/>
           </a:stretch>
         </p:blipFill>
         <p:spPr>
           <a:xfrm>
-            <a:off x="7047976" y="0"/>
-            <a:ext cx="5144024" cy="4873625"/>
+            <a:off x="81419" y="807777"/>
+            <a:ext cx="12029162" cy="6050223"/>
           </a:xfrm>
         </p:spPr>
       </p:pic>
       <p:sp>
         <p:nvSpPr>
-          <p:cNvPr id="7" name="文字版面配置區 6">
-            <a:extLst>
-              <a:ext uri="{FF2B5EF4-FFF2-40B4-BE49-F238E27FC236}">
-                <a16:creationId xmlns:a16="http://schemas.microsoft.com/office/drawing/2014/main" id="{D9F72D2C-5096-4238-AFE8-6ACD295506B5}"/>
+          <p:cNvPr id="2" name="標題 1">
+            <a:extLst>
+              <a:ext uri="{FF2B5EF4-FFF2-40B4-BE49-F238E27FC236}">
+                <a16:creationId xmlns:a16="http://schemas.microsoft.com/office/drawing/2014/main" id="{5D300D38-382A-475A-8351-C0EB9C8BA576}"/>
+              </a:ext>
+            </a:extLst>
+          </p:cNvPr>
+          <p:cNvSpPr>
+            <a:spLocks noGrp="1"/>
+          </p:cNvSpPr>
+          <p:nvPr>
+            <p:ph type="title"/>
+          </p:nvPr>
+        </p:nvSpPr>
+        <p:spPr/>
+        <p:txBody>
+          <a:bodyPr/>
+          <a:lstStyle/>
+          <a:p>
+            <a:r>
+              <a:rPr lang="en-US" altLang="zh-TW" dirty="0"/>
+              <a:t>Pos estimation</a:t>
+            </a:r>
+            <a:endParaRPr lang="zh-TW" altLang="en-US" dirty="0"/>
+          </a:p>
+        </p:txBody>
+      </p:sp>
+      <p:sp>
+        <p:nvSpPr>
+          <p:cNvPr id="4" name="文字版面配置區 3">
+            <a:extLst>
+              <a:ext uri="{FF2B5EF4-FFF2-40B4-BE49-F238E27FC236}">
+                <a16:creationId xmlns:a16="http://schemas.microsoft.com/office/drawing/2014/main" id="{00850975-066F-48A0-BBAC-6947C0C80A97}"/>
               </a:ext>
             </a:extLst>
           </p:cNvPr>
@@ -3709,100 +3998,17 @@
           <a:bodyPr/>
           <a:lstStyle/>
           <a:p>
-            <a:endParaRPr lang="zh-TW" altLang="en-US"/>
-          </a:p>
-        </p:txBody>
-      </p:sp>
-      <p:sp>
-        <p:nvSpPr>
-          <p:cNvPr id="10" name="文字方塊 9">
-            <a:extLst>
-              <a:ext uri="{FF2B5EF4-FFF2-40B4-BE49-F238E27FC236}">
-                <a16:creationId xmlns:a16="http://schemas.microsoft.com/office/drawing/2014/main" id="{A769796E-253E-411E-BC17-04D44178A5F1}"/>
-              </a:ext>
-            </a:extLst>
-          </p:cNvPr>
-          <p:cNvSpPr txBox="1"/>
-          <p:nvPr/>
-        </p:nvSpPr>
-        <p:spPr>
-          <a:xfrm>
-            <a:off x="4772025" y="4873625"/>
-            <a:ext cx="6637971" cy="1754326"/>
-          </a:xfrm>
-          <a:prstGeom prst="rect">
-            <a:avLst/>
-          </a:prstGeom>
-          <a:noFill/>
-        </p:spPr>
-        <p:txBody>
-          <a:bodyPr wrap="none" rtlCol="0">
-            <a:spAutoFit/>
-          </a:bodyPr>
-          <a:lstStyle/>
-          <a:p>
-            <a:r>
-              <a:rPr lang="en-US" altLang="zh-TW" dirty="0"/>
-              <a:t>YOLO!!!!!!!!!!!!!</a:t>
-            </a:r>
-          </a:p>
-          <a:p>
-            <a:pPr marL="342900" indent="-342900">
-              <a:buFont typeface="+mj-lt"/>
-              <a:buAutoNum type="arabicPeriod"/>
-            </a:pPr>
-            <a:r>
-              <a:rPr lang="en-US" altLang="zh-TW" dirty="0"/>
-              <a:t>Data prepare</a:t>
-            </a:r>
-          </a:p>
-          <a:p>
-            <a:pPr marL="800100" lvl="1" indent="-342900">
-              <a:buFont typeface="Arial" panose="020B0604020202020204" pitchFamily="34" charset="0"/>
-              <a:buChar char="•"/>
-            </a:pPr>
-            <a:r>
-              <a:rPr lang="en-US" altLang="zh-TW" dirty="0"/>
-              <a:t>Randomly put items on image and give corresponding labels</a:t>
-            </a:r>
-          </a:p>
-          <a:p>
-            <a:pPr marL="1257300" lvl="2" indent="-342900">
-              <a:buFont typeface="Arial" panose="020B0604020202020204" pitchFamily="34" charset="0"/>
-              <a:buChar char="•"/>
-            </a:pPr>
-            <a:r>
-              <a:rPr lang="en-US" altLang="zh-TW" dirty="0"/>
-              <a:t>Data quality is important</a:t>
-            </a:r>
-          </a:p>
-          <a:p>
-            <a:pPr marL="342900" indent="-342900">
-              <a:buFont typeface="+mj-lt"/>
-              <a:buAutoNum type="arabicPeriod"/>
-            </a:pPr>
-            <a:r>
-              <a:rPr lang="en-US" altLang="zh-TW" dirty="0"/>
-              <a:t>Train</a:t>
-            </a:r>
-          </a:p>
-          <a:p>
-            <a:pPr marL="800100" lvl="1" indent="-342900">
-              <a:buFont typeface="Arial" panose="020B0604020202020204" pitchFamily="34" charset="0"/>
-              <a:buChar char="•"/>
-            </a:pPr>
-            <a:r>
-              <a:rPr lang="en-US" altLang="zh-TW" dirty="0"/>
-              <a:t>Well… just run it.</a:t>
-            </a:r>
-            <a:endParaRPr lang="zh-TW" altLang="en-US" dirty="0"/>
+            <a:r>
+              <a:rPr lang="zh-TW" altLang="en-US" dirty="0"/>
+              <a:t>考慮位置到不了的問題</a:t>
+            </a:r>
           </a:p>
         </p:txBody>
       </p:sp>
     </p:spTree>
     <p:extLst>
       <p:ext uri="{BB962C8B-B14F-4D97-AF65-F5344CB8AC3E}">
-        <p14:creationId xmlns:p14="http://schemas.microsoft.com/office/powerpoint/2010/main" val="872799080"/>
+        <p14:creationId xmlns:p14="http://schemas.microsoft.com/office/powerpoint/2010/main" val="461313626"/>
       </p:ext>
     </p:extLst>
   </p:cSld>
@@ -3834,6 +4040,452 @@
           <p:cNvPr id="2" name="標題 1">
             <a:extLst>
               <a:ext uri="{FF2B5EF4-FFF2-40B4-BE49-F238E27FC236}">
+                <a16:creationId xmlns:a16="http://schemas.microsoft.com/office/drawing/2014/main" id="{852FEB40-7A28-41DC-8284-EAC4E7101F4C}"/>
+              </a:ext>
+            </a:extLst>
+          </p:cNvPr>
+          <p:cNvSpPr>
+            <a:spLocks noGrp="1"/>
+          </p:cNvSpPr>
+          <p:nvPr>
+            <p:ph type="title"/>
+          </p:nvPr>
+        </p:nvSpPr>
+        <p:spPr/>
+        <p:txBody>
+          <a:bodyPr/>
+          <a:lstStyle/>
+          <a:p>
+            <a:r>
+              <a:rPr lang="en-US" altLang="zh-TW" dirty="0"/>
+              <a:t>Pos estimation</a:t>
+            </a:r>
+            <a:endParaRPr lang="zh-TW" altLang="en-US" dirty="0"/>
+          </a:p>
+        </p:txBody>
+      </p:sp>
+      <p:sp>
+        <p:nvSpPr>
+          <p:cNvPr id="3" name="內容版面配置區 2">
+            <a:extLst>
+              <a:ext uri="{FF2B5EF4-FFF2-40B4-BE49-F238E27FC236}">
+                <a16:creationId xmlns:a16="http://schemas.microsoft.com/office/drawing/2014/main" id="{A303DC19-D294-4647-97D6-D51C4D4C40CE}"/>
+              </a:ext>
+            </a:extLst>
+          </p:cNvPr>
+          <p:cNvSpPr>
+            <a:spLocks noGrp="1"/>
+          </p:cNvSpPr>
+          <p:nvPr>
+            <p:ph idx="1"/>
+          </p:nvPr>
+        </p:nvSpPr>
+        <p:spPr/>
+        <p:txBody>
+          <a:bodyPr/>
+          <a:lstStyle/>
+          <a:p>
+            <a:r>
+              <a:rPr lang="zh-TW" altLang="en-US" dirty="0"/>
+              <a:t>移動到所偵測出物件的中心點</a:t>
+            </a:r>
+            <a:endParaRPr lang="en-US" altLang="zh-TW" dirty="0"/>
+          </a:p>
+          <a:p>
+            <a:r>
+              <a:rPr lang="zh-TW" altLang="en-US" dirty="0"/>
+              <a:t>可能要多次修正</a:t>
+            </a:r>
+          </a:p>
+        </p:txBody>
+      </p:sp>
+      <p:sp>
+        <p:nvSpPr>
+          <p:cNvPr id="4" name="文字版面配置區 3">
+            <a:extLst>
+              <a:ext uri="{FF2B5EF4-FFF2-40B4-BE49-F238E27FC236}">
+                <a16:creationId xmlns:a16="http://schemas.microsoft.com/office/drawing/2014/main" id="{73FB720B-4878-4D8E-A77B-4AD842124949}"/>
+              </a:ext>
+            </a:extLst>
+          </p:cNvPr>
+          <p:cNvSpPr>
+            <a:spLocks noGrp="1"/>
+          </p:cNvSpPr>
+          <p:nvPr>
+            <p:ph type="body" sz="half" idx="2"/>
+          </p:nvPr>
+        </p:nvSpPr>
+        <p:spPr/>
+        <p:txBody>
+          <a:bodyPr/>
+          <a:lstStyle/>
+          <a:p>
+            <a:endParaRPr lang="zh-TW" altLang="en-US" dirty="0"/>
+          </a:p>
+        </p:txBody>
+      </p:sp>
+    </p:spTree>
+    <p:extLst>
+      <p:ext uri="{BB962C8B-B14F-4D97-AF65-F5344CB8AC3E}">
+        <p14:creationId xmlns:p14="http://schemas.microsoft.com/office/powerpoint/2010/main" val="4085392639"/>
+      </p:ext>
+    </p:extLst>
+  </p:cSld>
+  <p:clrMapOvr>
+    <a:masterClrMapping/>
+  </p:clrMapOvr>
+</p:sld>
+</file>
+
+<file path=ppt/slides/slide5.xml><?xml version="1.0" encoding="utf-8"?>
+<p:sld xmlns:a="http://schemas.openxmlformats.org/drawingml/2006/main" xmlns:r="http://schemas.openxmlformats.org/officeDocument/2006/relationships" xmlns:p="http://schemas.openxmlformats.org/presentationml/2006/main">
+  <p:cSld>
+    <p:spTree>
+      <p:nvGrpSpPr>
+        <p:cNvPr id="1" name=""/>
+        <p:cNvGrpSpPr/>
+        <p:nvPr/>
+      </p:nvGrpSpPr>
+      <p:grpSpPr>
+        <a:xfrm>
+          <a:off x="0" y="0"/>
+          <a:ext cx="0" cy="0"/>
+          <a:chOff x="0" y="0"/>
+          <a:chExt cx="0" cy="0"/>
+        </a:xfrm>
+      </p:grpSpPr>
+      <p:sp>
+        <p:nvSpPr>
+          <p:cNvPr id="2" name="標題 1">
+            <a:extLst>
+              <a:ext uri="{FF2B5EF4-FFF2-40B4-BE49-F238E27FC236}">
+                <a16:creationId xmlns:a16="http://schemas.microsoft.com/office/drawing/2014/main" id="{6DB193F5-1B5A-44D6-AE88-CA66E7B57BEF}"/>
+              </a:ext>
+            </a:extLst>
+          </p:cNvPr>
+          <p:cNvSpPr>
+            <a:spLocks noGrp="1"/>
+          </p:cNvSpPr>
+          <p:nvPr>
+            <p:ph type="title"/>
+          </p:nvPr>
+        </p:nvSpPr>
+        <p:spPr/>
+        <p:txBody>
+          <a:bodyPr/>
+          <a:lstStyle/>
+          <a:p>
+            <a:r>
+              <a:rPr lang="en-US" altLang="zh-TW" dirty="0"/>
+              <a:t>Calibration</a:t>
+            </a:r>
+            <a:endParaRPr lang="zh-TW" altLang="en-US" dirty="0"/>
+          </a:p>
+        </p:txBody>
+      </p:sp>
+      <p:pic>
+        <p:nvPicPr>
+          <p:cNvPr id="6" name="內容版面配置區 5">
+            <a:extLst>
+              <a:ext uri="{FF2B5EF4-FFF2-40B4-BE49-F238E27FC236}">
+                <a16:creationId xmlns:a16="http://schemas.microsoft.com/office/drawing/2014/main" id="{F085840A-9A52-4A23-9C2D-92FBA697ECD9}"/>
+              </a:ext>
+            </a:extLst>
+          </p:cNvPr>
+          <p:cNvPicPr>
+            <a:picLocks noGrp="1" noChangeAspect="1"/>
+          </p:cNvPicPr>
+          <p:nvPr>
+            <p:ph idx="1"/>
+          </p:nvPr>
+        </p:nvPicPr>
+        <p:blipFill>
+          <a:blip r:embed="rId2"/>
+          <a:stretch>
+            <a:fillRect/>
+          </a:stretch>
+        </p:blipFill>
+        <p:spPr>
+          <a:xfrm>
+            <a:off x="5360565" y="1080921"/>
+            <a:ext cx="6674987" cy="5660973"/>
+          </a:xfrm>
+        </p:spPr>
+      </p:pic>
+      <p:sp>
+        <p:nvSpPr>
+          <p:cNvPr id="4" name="文字版面配置區 3">
+            <a:extLst>
+              <a:ext uri="{FF2B5EF4-FFF2-40B4-BE49-F238E27FC236}">
+                <a16:creationId xmlns:a16="http://schemas.microsoft.com/office/drawing/2014/main" id="{52227F26-E42C-4C24-9D76-7AAB2E994D72}"/>
+              </a:ext>
+            </a:extLst>
+          </p:cNvPr>
+          <p:cNvSpPr>
+            <a:spLocks noGrp="1"/>
+          </p:cNvSpPr>
+          <p:nvPr>
+            <p:ph type="body" sz="half" idx="2"/>
+          </p:nvPr>
+        </p:nvSpPr>
+        <p:spPr/>
+        <p:txBody>
+          <a:bodyPr/>
+          <a:lstStyle/>
+          <a:p>
+            <a:r>
+              <a:rPr lang="zh-TW" altLang="en-US" dirty="0"/>
+              <a:t>透過</a:t>
+            </a:r>
+            <a:r>
+              <a:rPr lang="en-US" altLang="zh-TW" dirty="0" err="1"/>
+              <a:t>ar</a:t>
+            </a:r>
+            <a:r>
+              <a:rPr lang="en-US" altLang="zh-TW" dirty="0"/>
+              <a:t> tag</a:t>
+            </a:r>
+            <a:r>
+              <a:rPr lang="zh-TW" altLang="en-US" dirty="0"/>
+              <a:t>切出綠色的區域</a:t>
+            </a:r>
+          </a:p>
+        </p:txBody>
+      </p:sp>
+    </p:spTree>
+    <p:extLst>
+      <p:ext uri="{BB962C8B-B14F-4D97-AF65-F5344CB8AC3E}">
+        <p14:creationId xmlns:p14="http://schemas.microsoft.com/office/powerpoint/2010/main" val="1166897011"/>
+      </p:ext>
+    </p:extLst>
+  </p:cSld>
+  <p:clrMapOvr>
+    <a:masterClrMapping/>
+  </p:clrMapOvr>
+</p:sld>
+</file>
+
+<file path=ppt/slides/slide6.xml><?xml version="1.0" encoding="utf-8"?>
+<p:sld xmlns:a="http://schemas.openxmlformats.org/drawingml/2006/main" xmlns:r="http://schemas.openxmlformats.org/officeDocument/2006/relationships" xmlns:p="http://schemas.openxmlformats.org/presentationml/2006/main">
+  <p:cSld>
+    <p:spTree>
+      <p:nvGrpSpPr>
+        <p:cNvPr id="1" name=""/>
+        <p:cNvGrpSpPr/>
+        <p:nvPr/>
+      </p:nvGrpSpPr>
+      <p:grpSpPr>
+        <a:xfrm>
+          <a:off x="0" y="0"/>
+          <a:ext cx="0" cy="0"/>
+          <a:chOff x="0" y="0"/>
+          <a:chExt cx="0" cy="0"/>
+        </a:xfrm>
+      </p:grpSpPr>
+      <p:sp>
+        <p:nvSpPr>
+          <p:cNvPr id="5" name="標題 4">
+            <a:extLst>
+              <a:ext uri="{FF2B5EF4-FFF2-40B4-BE49-F238E27FC236}">
+                <a16:creationId xmlns:a16="http://schemas.microsoft.com/office/drawing/2014/main" id="{4135E36C-5D6D-4F3A-AFC7-FE6129E42A2A}"/>
+              </a:ext>
+            </a:extLst>
+          </p:cNvPr>
+          <p:cNvSpPr>
+            <a:spLocks noGrp="1"/>
+          </p:cNvSpPr>
+          <p:nvPr>
+            <p:ph type="title"/>
+          </p:nvPr>
+        </p:nvSpPr>
+        <p:spPr/>
+        <p:txBody>
+          <a:bodyPr/>
+          <a:lstStyle/>
+          <a:p>
+            <a:r>
+              <a:rPr lang="en-US" altLang="zh-TW" dirty="0"/>
+              <a:t>Detection</a:t>
+            </a:r>
+            <a:endParaRPr lang="zh-TW" altLang="en-US" dirty="0"/>
+          </a:p>
+        </p:txBody>
+      </p:sp>
+      <p:pic>
+        <p:nvPicPr>
+          <p:cNvPr id="9" name="內容版面配置區 8">
+            <a:extLst>
+              <a:ext uri="{FF2B5EF4-FFF2-40B4-BE49-F238E27FC236}">
+                <a16:creationId xmlns:a16="http://schemas.microsoft.com/office/drawing/2014/main" id="{44F97183-A505-426C-9C8A-792A86951D80}"/>
+              </a:ext>
+            </a:extLst>
+          </p:cNvPr>
+          <p:cNvPicPr>
+            <a:picLocks noGrp="1" noChangeAspect="1"/>
+          </p:cNvPicPr>
+          <p:nvPr>
+            <p:ph idx="1"/>
+          </p:nvPr>
+        </p:nvPicPr>
+        <p:blipFill>
+          <a:blip r:embed="rId2"/>
+          <a:stretch>
+            <a:fillRect/>
+          </a:stretch>
+        </p:blipFill>
+        <p:spPr>
+          <a:xfrm>
+            <a:off x="7047976" y="0"/>
+            <a:ext cx="5144024" cy="4873625"/>
+          </a:xfrm>
+        </p:spPr>
+      </p:pic>
+      <p:sp>
+        <p:nvSpPr>
+          <p:cNvPr id="7" name="文字版面配置區 6">
+            <a:extLst>
+              <a:ext uri="{FF2B5EF4-FFF2-40B4-BE49-F238E27FC236}">
+                <a16:creationId xmlns:a16="http://schemas.microsoft.com/office/drawing/2014/main" id="{D9F72D2C-5096-4238-AFE8-6ACD295506B5}"/>
+              </a:ext>
+            </a:extLst>
+          </p:cNvPr>
+          <p:cNvSpPr>
+            <a:spLocks noGrp="1"/>
+          </p:cNvSpPr>
+          <p:nvPr>
+            <p:ph type="body" sz="half" idx="2"/>
+          </p:nvPr>
+        </p:nvSpPr>
+        <p:spPr/>
+        <p:txBody>
+          <a:bodyPr/>
+          <a:lstStyle/>
+          <a:p>
+            <a:endParaRPr lang="zh-TW" altLang="en-US"/>
+          </a:p>
+        </p:txBody>
+      </p:sp>
+      <p:sp>
+        <p:nvSpPr>
+          <p:cNvPr id="10" name="文字方塊 9">
+            <a:extLst>
+              <a:ext uri="{FF2B5EF4-FFF2-40B4-BE49-F238E27FC236}">
+                <a16:creationId xmlns:a16="http://schemas.microsoft.com/office/drawing/2014/main" id="{A769796E-253E-411E-BC17-04D44178A5F1}"/>
+              </a:ext>
+            </a:extLst>
+          </p:cNvPr>
+          <p:cNvSpPr txBox="1"/>
+          <p:nvPr/>
+        </p:nvSpPr>
+        <p:spPr>
+          <a:xfrm>
+            <a:off x="4772025" y="4873625"/>
+            <a:ext cx="6637971" cy="1754326"/>
+          </a:xfrm>
+          <a:prstGeom prst="rect">
+            <a:avLst/>
+          </a:prstGeom>
+          <a:noFill/>
+        </p:spPr>
+        <p:txBody>
+          <a:bodyPr wrap="none" rtlCol="0">
+            <a:spAutoFit/>
+          </a:bodyPr>
+          <a:lstStyle/>
+          <a:p>
+            <a:r>
+              <a:rPr lang="en-US" altLang="zh-TW" dirty="0"/>
+              <a:t>YOLO!!!!!!!!!!!!!</a:t>
+            </a:r>
+          </a:p>
+          <a:p>
+            <a:pPr marL="342900" indent="-342900">
+              <a:buFont typeface="+mj-lt"/>
+              <a:buAutoNum type="arabicPeriod"/>
+            </a:pPr>
+            <a:r>
+              <a:rPr lang="en-US" altLang="zh-TW" dirty="0"/>
+              <a:t>Data prepare</a:t>
+            </a:r>
+          </a:p>
+          <a:p>
+            <a:pPr marL="800100" lvl="1" indent="-342900">
+              <a:buFont typeface="Arial" panose="020B0604020202020204" pitchFamily="34" charset="0"/>
+              <a:buChar char="•"/>
+            </a:pPr>
+            <a:r>
+              <a:rPr lang="en-US" altLang="zh-TW" dirty="0"/>
+              <a:t>Randomly put items on image and give corresponding labels</a:t>
+            </a:r>
+          </a:p>
+          <a:p>
+            <a:pPr marL="1257300" lvl="2" indent="-342900">
+              <a:buFont typeface="Arial" panose="020B0604020202020204" pitchFamily="34" charset="0"/>
+              <a:buChar char="•"/>
+            </a:pPr>
+            <a:r>
+              <a:rPr lang="en-US" altLang="zh-TW" dirty="0"/>
+              <a:t>Data quality is important</a:t>
+            </a:r>
+          </a:p>
+          <a:p>
+            <a:pPr marL="342900" indent="-342900">
+              <a:buFont typeface="+mj-lt"/>
+              <a:buAutoNum type="arabicPeriod"/>
+            </a:pPr>
+            <a:r>
+              <a:rPr lang="en-US" altLang="zh-TW" dirty="0"/>
+              <a:t>Train</a:t>
+            </a:r>
+          </a:p>
+          <a:p>
+            <a:pPr marL="800100" lvl="1" indent="-342900">
+              <a:buFont typeface="Arial" panose="020B0604020202020204" pitchFamily="34" charset="0"/>
+              <a:buChar char="•"/>
+            </a:pPr>
+            <a:r>
+              <a:rPr lang="en-US" altLang="zh-TW" dirty="0"/>
+              <a:t>Well… just run it.</a:t>
+            </a:r>
+            <a:endParaRPr lang="zh-TW" altLang="en-US" dirty="0"/>
+          </a:p>
+        </p:txBody>
+      </p:sp>
+    </p:spTree>
+    <p:extLst>
+      <p:ext uri="{BB962C8B-B14F-4D97-AF65-F5344CB8AC3E}">
+        <p14:creationId xmlns:p14="http://schemas.microsoft.com/office/powerpoint/2010/main" val="872799080"/>
+      </p:ext>
+    </p:extLst>
+  </p:cSld>
+  <p:clrMapOvr>
+    <a:masterClrMapping/>
+  </p:clrMapOvr>
+</p:sld>
+</file>
+
+<file path=ppt/slides/slide7.xml><?xml version="1.0" encoding="utf-8"?>
+<p:sld xmlns:a="http://schemas.openxmlformats.org/drawingml/2006/main" xmlns:r="http://schemas.openxmlformats.org/officeDocument/2006/relationships" xmlns:p="http://schemas.openxmlformats.org/presentationml/2006/main">
+  <p:cSld>
+    <p:spTree>
+      <p:nvGrpSpPr>
+        <p:cNvPr id="1" name=""/>
+        <p:cNvGrpSpPr/>
+        <p:nvPr/>
+      </p:nvGrpSpPr>
+      <p:grpSpPr>
+        <a:xfrm>
+          <a:off x="0" y="0"/>
+          <a:ext cx="0" cy="0"/>
+          <a:chOff x="0" y="0"/>
+          <a:chExt cx="0" cy="0"/>
+        </a:xfrm>
+      </p:grpSpPr>
+      <p:sp>
+        <p:nvSpPr>
+          <p:cNvPr id="2" name="標題 1">
+            <a:extLst>
+              <a:ext uri="{FF2B5EF4-FFF2-40B4-BE49-F238E27FC236}">
                 <a16:creationId xmlns:a16="http://schemas.microsoft.com/office/drawing/2014/main" id="{57F6595E-AA9C-4183-8945-1BD78FECB9AE}"/>
               </a:ext>
             </a:extLst>
@@ -3881,7 +4533,7 @@
           <a:p>
             <a:r>
               <a:rPr lang="en-US" altLang="zh-TW" dirty="0"/>
-              <a:t>Input: image</a:t>
+              <a:t>Input: image(arraylike)</a:t>
             </a:r>
           </a:p>
           <a:p>
@@ -3901,6 +4553,10 @@
               <a:rPr lang="en-US" altLang="zh-TW" dirty="0" err="1"/>
               <a:t>bbox</a:t>
             </a:r>
+            <a:r>
+              <a:rPr lang="en-US" altLang="zh-TW" dirty="0"/>
+              <a:t>, ML is tensor</a:t>
+            </a:r>
             <a:endParaRPr lang="zh-TW" altLang="en-US" dirty="0"/>
           </a:p>
         </p:txBody>
@@ -3926,7 +4582,7 @@
           <a:bodyPr/>
           <a:lstStyle/>
           <a:p>
-            <a:endParaRPr lang="zh-TW" altLang="en-US"/>
+            <a:endParaRPr lang="zh-TW" altLang="en-US" dirty="0"/>
           </a:p>
         </p:txBody>
       </p:sp>
@@ -4031,7 +4687,7 @@
 </p:sld>
 </file>
 
-<file path=ppt/slides/slide5.xml><?xml version="1.0" encoding="utf-8"?>
+<file path=ppt/slides/slide8.xml><?xml version="1.0" encoding="utf-8"?>
 <p:sld xmlns:a="http://schemas.openxmlformats.org/drawingml/2006/main" xmlns:r="http://schemas.openxmlformats.org/officeDocument/2006/relationships" xmlns:p="http://schemas.openxmlformats.org/presentationml/2006/main">
   <p:cSld>
     <p:spTree>
@@ -4261,7 +4917,7 @@
 </p:sld>
 </file>
 
-<file path=ppt/slides/slide6.xml><?xml version="1.0" encoding="utf-8"?>
+<file path=ppt/slides/slide9.xml><?xml version="1.0" encoding="utf-8"?>
 <p:sld xmlns:a="http://schemas.openxmlformats.org/drawingml/2006/main" xmlns:r="http://schemas.openxmlformats.org/officeDocument/2006/relationships" xmlns:p="http://schemas.openxmlformats.org/presentationml/2006/main">
   <p:cSld>
     <p:spTree>
@@ -4389,119 +5045,6 @@
     <p:extLst>
       <p:ext uri="{BB962C8B-B14F-4D97-AF65-F5344CB8AC3E}">
         <p14:creationId xmlns:p14="http://schemas.microsoft.com/office/powerpoint/2010/main" val="2008734921"/>
-      </p:ext>
-    </p:extLst>
-  </p:cSld>
-  <p:clrMapOvr>
-    <a:masterClrMapping/>
-  </p:clrMapOvr>
-</p:sld>
-</file>
-
-<file path=ppt/slides/slide7.xml><?xml version="1.0" encoding="utf-8"?>
-<p:sld xmlns:a="http://schemas.openxmlformats.org/drawingml/2006/main" xmlns:r="http://schemas.openxmlformats.org/officeDocument/2006/relationships" xmlns:p="http://schemas.openxmlformats.org/presentationml/2006/main">
-  <p:cSld>
-    <p:spTree>
-      <p:nvGrpSpPr>
-        <p:cNvPr id="1" name=""/>
-        <p:cNvGrpSpPr/>
-        <p:nvPr/>
-      </p:nvGrpSpPr>
-      <p:grpSpPr>
-        <a:xfrm>
-          <a:off x="0" y="0"/>
-          <a:ext cx="0" cy="0"/>
-          <a:chOff x="0" y="0"/>
-          <a:chExt cx="0" cy="0"/>
-        </a:xfrm>
-      </p:grpSpPr>
-      <p:sp>
-        <p:nvSpPr>
-          <p:cNvPr id="2" name="標題 1">
-            <a:extLst>
-              <a:ext uri="{FF2B5EF4-FFF2-40B4-BE49-F238E27FC236}">
-                <a16:creationId xmlns:a16="http://schemas.microsoft.com/office/drawing/2014/main" id="{F3251EE3-41A4-4B6F-915B-153BA5E0B7C7}"/>
-              </a:ext>
-            </a:extLst>
-          </p:cNvPr>
-          <p:cNvSpPr>
-            <a:spLocks noGrp="1"/>
-          </p:cNvSpPr>
-          <p:nvPr>
-            <p:ph type="title"/>
-          </p:nvPr>
-        </p:nvSpPr>
-        <p:spPr/>
-        <p:txBody>
-          <a:bodyPr/>
-          <a:lstStyle/>
-          <a:p>
-            <a:r>
-              <a:rPr lang="en-US" altLang="zh-TW" dirty="0"/>
-              <a:t>Create module</a:t>
-            </a:r>
-            <a:endParaRPr lang="zh-TW" altLang="en-US" dirty="0"/>
-          </a:p>
-        </p:txBody>
-      </p:sp>
-      <p:pic>
-        <p:nvPicPr>
-          <p:cNvPr id="6" name="內容版面配置區 5">
-            <a:extLst>
-              <a:ext uri="{FF2B5EF4-FFF2-40B4-BE49-F238E27FC236}">
-                <a16:creationId xmlns:a16="http://schemas.microsoft.com/office/drawing/2014/main" id="{F6BC85E0-8BDD-4C8C-825C-4630BEE17E1E}"/>
-              </a:ext>
-            </a:extLst>
-          </p:cNvPr>
-          <p:cNvPicPr>
-            <a:picLocks noGrp="1" noChangeAspect="1"/>
-          </p:cNvPicPr>
-          <p:nvPr>
-            <p:ph idx="1"/>
-          </p:nvPr>
-        </p:nvPicPr>
-        <p:blipFill>
-          <a:blip r:embed="rId2"/>
-          <a:stretch>
-            <a:fillRect/>
-          </a:stretch>
-        </p:blipFill>
-        <p:spPr>
-          <a:xfrm>
-            <a:off x="6099621" y="0"/>
-            <a:ext cx="6092380" cy="6858001"/>
-          </a:xfrm>
-        </p:spPr>
-      </p:pic>
-      <p:sp>
-        <p:nvSpPr>
-          <p:cNvPr id="4" name="文字版面配置區 3">
-            <a:extLst>
-              <a:ext uri="{FF2B5EF4-FFF2-40B4-BE49-F238E27FC236}">
-                <a16:creationId xmlns:a16="http://schemas.microsoft.com/office/drawing/2014/main" id="{FEEBFCFD-0289-4D98-B2BC-12BBD865C819}"/>
-              </a:ext>
-            </a:extLst>
-          </p:cNvPr>
-          <p:cNvSpPr>
-            <a:spLocks noGrp="1"/>
-          </p:cNvSpPr>
-          <p:nvPr>
-            <p:ph type="body" sz="half" idx="2"/>
-          </p:nvPr>
-        </p:nvSpPr>
-        <p:spPr/>
-        <p:txBody>
-          <a:bodyPr/>
-          <a:lstStyle/>
-          <a:p>
-            <a:endParaRPr lang="zh-TW" altLang="en-US"/>
-          </a:p>
-        </p:txBody>
-      </p:sp>
-    </p:spTree>
-    <p:extLst>
-      <p:ext uri="{BB962C8B-B14F-4D97-AF65-F5344CB8AC3E}">
-        <p14:creationId xmlns:p14="http://schemas.microsoft.com/office/powerpoint/2010/main" val="1708953756"/>
       </p:ext>
     </p:extLst>
   </p:cSld>

</xml_diff>